<commit_message>
Profile Sayfası Metotlar Tamamlandı.
</commit_message>
<xml_diff>
--- a/Documents/DUYARLIOL.pptx
+++ b/Documents/DUYARLIOL.pptx
@@ -18,13 +18,12 @@
     <p:sldId id="266" r:id="rId12"/>
     <p:sldId id="267" r:id="rId13"/>
     <p:sldId id="268" r:id="rId14"/>
-    <p:sldId id="269" r:id="rId15"/>
-    <p:sldId id="271" r:id="rId16"/>
-    <p:sldId id="274" r:id="rId17"/>
-    <p:sldId id="273" r:id="rId18"/>
-    <p:sldId id="275" r:id="rId19"/>
-    <p:sldId id="276" r:id="rId20"/>
-    <p:sldId id="277" r:id="rId21"/>
+    <p:sldId id="271" r:id="rId15"/>
+    <p:sldId id="274" r:id="rId16"/>
+    <p:sldId id="273" r:id="rId17"/>
+    <p:sldId id="275" r:id="rId18"/>
+    <p:sldId id="276" r:id="rId19"/>
+    <p:sldId id="277" r:id="rId20"/>
   </p:sldIdLst>
   <p:sldSz cx="9144000" cy="6858000" type="screen4x3"/>
   <p:notesSz cx="6858000" cy="9144000"/>
@@ -322,7 +321,7 @@
             <a:fld id="{9215268A-ECED-40C2-BA3B-556FDB639813}" type="datetimeFigureOut">
               <a:rPr lang="tr-TR" smtClean="0"/>
               <a:pPr/>
-              <a:t>25.3.2017</a:t>
+              <a:t>26.3.2017</a:t>
             </a:fld>
             <a:endParaRPr lang="tr-TR"/>
           </a:p>
@@ -376,6 +375,9 @@
   <p:clrMapOvr>
     <a:masterClrMapping/>
   </p:clrMapOvr>
+  <p:transition spd="med">
+    <p:pull/>
+  </p:transition>
 </p:sldLayout>
 </file>
 
@@ -487,7 +489,7 @@
             <a:fld id="{9215268A-ECED-40C2-BA3B-556FDB639813}" type="datetimeFigureOut">
               <a:rPr lang="tr-TR" smtClean="0"/>
               <a:pPr/>
-              <a:t>25.3.2017</a:t>
+              <a:t>26.3.2017</a:t>
             </a:fld>
             <a:endParaRPr lang="tr-TR"/>
           </a:p>
@@ -541,6 +543,9 @@
   <p:clrMapOvr>
     <a:masterClrMapping/>
   </p:clrMapOvr>
+  <p:transition spd="med">
+    <p:pull/>
+  </p:transition>
 </p:sldLayout>
 </file>
 
@@ -662,7 +667,7 @@
             <a:fld id="{9215268A-ECED-40C2-BA3B-556FDB639813}" type="datetimeFigureOut">
               <a:rPr lang="tr-TR" smtClean="0"/>
               <a:pPr/>
-              <a:t>25.3.2017</a:t>
+              <a:t>26.3.2017</a:t>
             </a:fld>
             <a:endParaRPr lang="tr-TR"/>
           </a:p>
@@ -716,6 +721,9 @@
   <p:clrMapOvr>
     <a:masterClrMapping/>
   </p:clrMapOvr>
+  <p:transition spd="med">
+    <p:pull/>
+  </p:transition>
 </p:sldLayout>
 </file>
 
@@ -827,7 +835,7 @@
             <a:fld id="{9215268A-ECED-40C2-BA3B-556FDB639813}" type="datetimeFigureOut">
               <a:rPr lang="tr-TR" smtClean="0"/>
               <a:pPr/>
-              <a:t>25.3.2017</a:t>
+              <a:t>26.3.2017</a:t>
             </a:fld>
             <a:endParaRPr lang="tr-TR"/>
           </a:p>
@@ -881,6 +889,9 @@
   <p:clrMapOvr>
     <a:masterClrMapping/>
   </p:clrMapOvr>
+  <p:transition spd="med">
+    <p:pull/>
+  </p:transition>
 </p:sldLayout>
 </file>
 
@@ -1069,7 +1080,7 @@
             <a:fld id="{9215268A-ECED-40C2-BA3B-556FDB639813}" type="datetimeFigureOut">
               <a:rPr lang="tr-TR" smtClean="0"/>
               <a:pPr/>
-              <a:t>25.3.2017</a:t>
+              <a:t>26.3.2017</a:t>
             </a:fld>
             <a:endParaRPr lang="tr-TR"/>
           </a:p>
@@ -1123,6 +1134,9 @@
   <p:clrMapOvr>
     <a:masterClrMapping/>
   </p:clrMapOvr>
+  <p:transition spd="med">
+    <p:pull/>
+  </p:transition>
 </p:sldLayout>
 </file>
 
@@ -1351,7 +1365,7 @@
             <a:fld id="{9215268A-ECED-40C2-BA3B-556FDB639813}" type="datetimeFigureOut">
               <a:rPr lang="tr-TR" smtClean="0"/>
               <a:pPr/>
-              <a:t>25.3.2017</a:t>
+              <a:t>26.3.2017</a:t>
             </a:fld>
             <a:endParaRPr lang="tr-TR"/>
           </a:p>
@@ -1405,6 +1419,9 @@
   <p:clrMapOvr>
     <a:masterClrMapping/>
   </p:clrMapOvr>
+  <p:transition spd="med">
+    <p:pull/>
+  </p:transition>
 </p:sldLayout>
 </file>
 
@@ -1767,7 +1784,7 @@
             <a:fld id="{9215268A-ECED-40C2-BA3B-556FDB639813}" type="datetimeFigureOut">
               <a:rPr lang="tr-TR" smtClean="0"/>
               <a:pPr/>
-              <a:t>25.3.2017</a:t>
+              <a:t>26.3.2017</a:t>
             </a:fld>
             <a:endParaRPr lang="tr-TR"/>
           </a:p>
@@ -1821,6 +1838,9 @@
   <p:clrMapOvr>
     <a:masterClrMapping/>
   </p:clrMapOvr>
+  <p:transition spd="med">
+    <p:pull/>
+  </p:transition>
 </p:sldLayout>
 </file>
 
@@ -1881,7 +1901,7 @@
             <a:fld id="{9215268A-ECED-40C2-BA3B-556FDB639813}" type="datetimeFigureOut">
               <a:rPr lang="tr-TR" smtClean="0"/>
               <a:pPr/>
-              <a:t>25.3.2017</a:t>
+              <a:t>26.3.2017</a:t>
             </a:fld>
             <a:endParaRPr lang="tr-TR"/>
           </a:p>
@@ -1935,6 +1955,9 @@
   <p:clrMapOvr>
     <a:masterClrMapping/>
   </p:clrMapOvr>
+  <p:transition spd="med">
+    <p:pull/>
+  </p:transition>
 </p:sldLayout>
 </file>
 
@@ -1973,7 +1996,7 @@
             <a:fld id="{9215268A-ECED-40C2-BA3B-556FDB639813}" type="datetimeFigureOut">
               <a:rPr lang="tr-TR" smtClean="0"/>
               <a:pPr/>
-              <a:t>25.3.2017</a:t>
+              <a:t>26.3.2017</a:t>
             </a:fld>
             <a:endParaRPr lang="tr-TR"/>
           </a:p>
@@ -2027,6 +2050,9 @@
   <p:clrMapOvr>
     <a:masterClrMapping/>
   </p:clrMapOvr>
+  <p:transition spd="med">
+    <p:pull/>
+  </p:transition>
 </p:sldLayout>
 </file>
 
@@ -2245,7 +2271,7 @@
             <a:fld id="{9215268A-ECED-40C2-BA3B-556FDB639813}" type="datetimeFigureOut">
               <a:rPr lang="tr-TR" smtClean="0"/>
               <a:pPr/>
-              <a:t>25.3.2017</a:t>
+              <a:t>26.3.2017</a:t>
             </a:fld>
             <a:endParaRPr lang="tr-TR"/>
           </a:p>
@@ -2299,6 +2325,9 @@
   <p:clrMapOvr>
     <a:masterClrMapping/>
   </p:clrMapOvr>
+  <p:transition spd="med">
+    <p:pull/>
+  </p:transition>
 </p:sldLayout>
 </file>
 
@@ -2494,7 +2523,7 @@
             <a:fld id="{9215268A-ECED-40C2-BA3B-556FDB639813}" type="datetimeFigureOut">
               <a:rPr lang="tr-TR" smtClean="0"/>
               <a:pPr/>
-              <a:t>25.3.2017</a:t>
+              <a:t>26.3.2017</a:t>
             </a:fld>
             <a:endParaRPr lang="tr-TR"/>
           </a:p>
@@ -2548,6 +2577,9 @@
   <p:clrMapOvr>
     <a:masterClrMapping/>
   </p:clrMapOvr>
+  <p:transition spd="med">
+    <p:pull/>
+  </p:transition>
 </p:sldLayout>
 </file>
 
@@ -2702,7 +2734,7 @@
             <a:fld id="{9215268A-ECED-40C2-BA3B-556FDB639813}" type="datetimeFigureOut">
               <a:rPr lang="tr-TR" smtClean="0"/>
               <a:pPr/>
-              <a:t>25.3.2017</a:t>
+              <a:t>26.3.2017</a:t>
             </a:fld>
             <a:endParaRPr lang="tr-TR"/>
           </a:p>
@@ -2803,6 +2835,9 @@
     <p:sldLayoutId id="2147483658" r:id="rId10"/>
     <p:sldLayoutId id="2147483659" r:id="rId11"/>
   </p:sldLayoutIdLst>
+  <p:transition spd="med">
+    <p:pull/>
+  </p:transition>
   <p:txStyles>
     <p:titleStyle>
       <a:lvl1pPr algn="ctr" defTabSz="914400" rtl="0" eaLnBrk="1" latinLnBrk="0" hangingPunct="1">
@@ -3189,6 +3224,9 @@
   <p:clrMapOvr>
     <a:masterClrMapping/>
   </p:clrMapOvr>
+  <p:transition spd="med">
+    <p:pull/>
+  </p:transition>
 </p:sld>
 </file>
 
@@ -4814,6 +4852,9 @@
   <p:clrMapOvr>
     <a:masterClrMapping/>
   </p:clrMapOvr>
+  <p:transition spd="med">
+    <p:pull/>
+  </p:transition>
 </p:sld>
 </file>
 
@@ -5074,6 +5115,9 @@
   <p:clrMapOvr>
     <a:masterClrMapping/>
   </p:clrMapOvr>
+  <p:transition spd="med">
+    <p:pull/>
+  </p:transition>
 </p:sld>
 </file>
 
@@ -5295,6 +5339,9 @@
   <p:clrMapOvr>
     <a:masterClrMapping/>
   </p:clrMapOvr>
+  <p:transition spd="med">
+    <p:pull/>
+  </p:transition>
 </p:sld>
 </file>
 
@@ -5428,7 +5475,39 @@
                 <a:ea typeface="Verdana" panose="020B0604030504040204" pitchFamily="34" charset="0"/>
                 <a:cs typeface="Verdana" panose="020B0604030504040204" pitchFamily="34" charset="0"/>
               </a:rPr>
-              <a:t>Analysis design and coding</a:t>
+              <a:t>Design </a:t>
+            </a:r>
+            <a:r>
+              <a:rPr lang="tr-TR" sz="1600" dirty="0" err="1">
+                <a:latin typeface="Verdana" panose="020B0604030504040204" pitchFamily="34" charset="0"/>
+                <a:ea typeface="Verdana" panose="020B0604030504040204" pitchFamily="34" charset="0"/>
+                <a:cs typeface="Verdana" panose="020B0604030504040204" pitchFamily="34" charset="0"/>
+              </a:rPr>
+              <a:t>analysis</a:t>
+            </a:r>
+            <a:r>
+              <a:rPr lang="tr-TR" sz="1600" dirty="0">
+                <a:latin typeface="Verdana" panose="020B0604030504040204" pitchFamily="34" charset="0"/>
+                <a:ea typeface="Verdana" panose="020B0604030504040204" pitchFamily="34" charset="0"/>
+                <a:cs typeface="Verdana" panose="020B0604030504040204" pitchFamily="34" charset="0"/>
+              </a:rPr>
+              <a:t> </a:t>
+            </a:r>
+            <a:r>
+              <a:rPr lang="tr-TR" sz="1600" dirty="0" err="1">
+                <a:latin typeface="Verdana" panose="020B0604030504040204" pitchFamily="34" charset="0"/>
+                <a:ea typeface="Verdana" panose="020B0604030504040204" pitchFamily="34" charset="0"/>
+                <a:cs typeface="Verdana" panose="020B0604030504040204" pitchFamily="34" charset="0"/>
+              </a:rPr>
+              <a:t>and</a:t>
+            </a:r>
+            <a:r>
+              <a:rPr lang="tr-TR" sz="1600" dirty="0">
+                <a:latin typeface="Verdana" panose="020B0604030504040204" pitchFamily="34" charset="0"/>
+                <a:ea typeface="Verdana" panose="020B0604030504040204" pitchFamily="34" charset="0"/>
+                <a:cs typeface="Verdana" panose="020B0604030504040204" pitchFamily="34" charset="0"/>
+              </a:rPr>
+              <a:t> coding</a:t>
             </a:r>
           </a:p>
           <a:p>
@@ -5756,338 +5835,13 @@
   <p:clrMapOvr>
     <a:masterClrMapping/>
   </p:clrMapOvr>
+  <p:transition spd="med">
+    <p:pull/>
+  </p:transition>
 </p:sld>
 </file>
 
 <file path=ppt/slides/slide14.xml><?xml version="1.0" encoding="utf-8"?>
-<p:sld xmlns:a="http://schemas.openxmlformats.org/drawingml/2006/main" xmlns:r="http://schemas.openxmlformats.org/officeDocument/2006/relationships" xmlns:p="http://schemas.openxmlformats.org/presentationml/2006/main">
-  <p:cSld>
-    <p:spTree>
-      <p:nvGrpSpPr>
-        <p:cNvPr id="1" name=""/>
-        <p:cNvGrpSpPr/>
-        <p:nvPr/>
-      </p:nvGrpSpPr>
-      <p:grpSpPr>
-        <a:xfrm>
-          <a:off x="0" y="0"/>
-          <a:ext cx="0" cy="0"/>
-          <a:chOff x="0" y="0"/>
-          <a:chExt cx="0" cy="0"/>
-        </a:xfrm>
-      </p:grpSpPr>
-      <p:sp>
-        <p:nvSpPr>
-          <p:cNvPr id="6" name="5 İçerik Yer Tutucusu"/>
-          <p:cNvSpPr>
-            <a:spLocks noGrp="1"/>
-          </p:cNvSpPr>
-          <p:nvPr>
-            <p:ph idx="1"/>
-          </p:nvPr>
-        </p:nvSpPr>
-        <p:spPr>
-          <a:xfrm>
-            <a:off x="539552" y="1556792"/>
-            <a:ext cx="8229600" cy="4392488"/>
-          </a:xfrm>
-        </p:spPr>
-        <p:txBody>
-          <a:bodyPr>
-            <a:noAutofit/>
-          </a:bodyPr>
-          <a:lstStyle/>
-          <a:p>
-            <a:pPr>
-              <a:buFont typeface="Wingdings" panose="05000000000000000000" pitchFamily="2" charset="2"/>
-              <a:buChar char="Ø"/>
-            </a:pPr>
-            <a:r>
-              <a:rPr lang="tr-TR" sz="2400" dirty="0">
-                <a:solidFill>
-                  <a:srgbClr val="002060"/>
-                </a:solidFill>
-                <a:latin typeface="Verdana" panose="020B0604030504040204" pitchFamily="34" charset="0"/>
-                <a:ea typeface="Verdana" panose="020B0604030504040204" pitchFamily="34" charset="0"/>
-                <a:cs typeface="Verdana" panose="020B0604030504040204" pitchFamily="34" charset="0"/>
-              </a:rPr>
-              <a:t>Planning</a:t>
-            </a:r>
-            <a:r>
-              <a:rPr lang="tr-TR" sz="2400" dirty="0">
-                <a:latin typeface="Verdana" panose="020B0604030504040204" pitchFamily="34" charset="0"/>
-                <a:ea typeface="Verdana" panose="020B0604030504040204" pitchFamily="34" charset="0"/>
-                <a:cs typeface="Verdana" panose="020B0604030504040204" pitchFamily="34" charset="0"/>
-              </a:rPr>
-              <a:t> :determining the requirements and alternative approaches</a:t>
-            </a:r>
-          </a:p>
-          <a:p>
-            <a:pPr>
-              <a:buFont typeface="Wingdings" panose="05000000000000000000" pitchFamily="2" charset="2"/>
-              <a:buChar char="Ø"/>
-            </a:pPr>
-            <a:r>
-              <a:rPr lang="tr-TR" sz="2400" dirty="0">
-                <a:solidFill>
-                  <a:srgbClr val="002060"/>
-                </a:solidFill>
-                <a:latin typeface="Verdana" panose="020B0604030504040204" pitchFamily="34" charset="0"/>
-                <a:ea typeface="Verdana" panose="020B0604030504040204" pitchFamily="34" charset="0"/>
-                <a:cs typeface="Verdana" panose="020B0604030504040204" pitchFamily="34" charset="0"/>
-              </a:rPr>
-              <a:t>Risk analysis </a:t>
-            </a:r>
-            <a:r>
-              <a:rPr lang="tr-TR" sz="2400" dirty="0">
-                <a:latin typeface="Verdana" panose="020B0604030504040204" pitchFamily="34" charset="0"/>
-                <a:ea typeface="Verdana" panose="020B0604030504040204" pitchFamily="34" charset="0"/>
-                <a:cs typeface="Verdana" panose="020B0604030504040204" pitchFamily="34" charset="0"/>
-              </a:rPr>
-              <a:t>:Alternative solution is examined,identfy the whole risk and produce a prototype</a:t>
-            </a:r>
-          </a:p>
-          <a:p>
-            <a:pPr>
-              <a:buFont typeface="Wingdings" panose="05000000000000000000" pitchFamily="2" charset="2"/>
-              <a:buChar char="Ø"/>
-            </a:pPr>
-            <a:r>
-              <a:rPr lang="tr-TR" sz="2400" dirty="0">
-                <a:solidFill>
-                  <a:srgbClr val="002060"/>
-                </a:solidFill>
-                <a:latin typeface="Verdana" panose="020B0604030504040204" pitchFamily="34" charset="0"/>
-                <a:ea typeface="Verdana" panose="020B0604030504040204" pitchFamily="34" charset="0"/>
-                <a:cs typeface="Verdana" panose="020B0604030504040204" pitchFamily="34" charset="0"/>
-              </a:rPr>
-              <a:t>Engineering</a:t>
-            </a:r>
-            <a:r>
-              <a:rPr lang="tr-TR" sz="2400" dirty="0">
-                <a:latin typeface="Verdana" panose="020B0604030504040204" pitchFamily="34" charset="0"/>
-                <a:ea typeface="Verdana" panose="020B0604030504040204" pitchFamily="34" charset="0"/>
-                <a:cs typeface="Verdana" panose="020B0604030504040204" pitchFamily="34" charset="0"/>
-              </a:rPr>
-              <a:t> : make a test and produce software</a:t>
-            </a:r>
-          </a:p>
-          <a:p>
-            <a:pPr>
-              <a:buFont typeface="Wingdings" panose="05000000000000000000" pitchFamily="2" charset="2"/>
-              <a:buChar char="Ø"/>
-            </a:pPr>
-            <a:r>
-              <a:rPr lang="tr-TR" sz="2400" dirty="0">
-                <a:solidFill>
-                  <a:srgbClr val="002060"/>
-                </a:solidFill>
-                <a:latin typeface="Verdana" panose="020B0604030504040204" pitchFamily="34" charset="0"/>
-                <a:ea typeface="Verdana" panose="020B0604030504040204" pitchFamily="34" charset="0"/>
-                <a:cs typeface="Verdana" panose="020B0604030504040204" pitchFamily="34" charset="0"/>
-              </a:rPr>
-              <a:t>Evaluation</a:t>
-            </a:r>
-            <a:r>
-              <a:rPr lang="tr-TR" sz="2400" dirty="0">
-                <a:latin typeface="Verdana" panose="020B0604030504040204" pitchFamily="34" charset="0"/>
-                <a:ea typeface="Verdana" panose="020B0604030504040204" pitchFamily="34" charset="0"/>
-                <a:cs typeface="Verdana" panose="020B0604030504040204" pitchFamily="34" charset="0"/>
-              </a:rPr>
-              <a:t> :Before entering the next spiral loop, </a:t>
-            </a:r>
-            <a:br>
-              <a:rPr lang="tr-TR" sz="2400" dirty="0">
-                <a:latin typeface="Verdana" panose="020B0604030504040204" pitchFamily="34" charset="0"/>
-                <a:ea typeface="Verdana" panose="020B0604030504040204" pitchFamily="34" charset="0"/>
-                <a:cs typeface="Verdana" panose="020B0604030504040204" pitchFamily="34" charset="0"/>
-              </a:rPr>
-            </a:br>
-            <a:r>
-              <a:rPr lang="tr-TR" sz="2400" dirty="0">
-                <a:latin typeface="Verdana" panose="020B0604030504040204" pitchFamily="34" charset="0"/>
-                <a:ea typeface="Verdana" panose="020B0604030504040204" pitchFamily="34" charset="0"/>
-                <a:cs typeface="Verdana" panose="020B0604030504040204" pitchFamily="34" charset="0"/>
-              </a:rPr>
-              <a:t>Previous project is evaluated </a:t>
-            </a:r>
-          </a:p>
-          <a:p>
-            <a:pPr>
-              <a:buFont typeface="Wingdings" panose="05000000000000000000" pitchFamily="2" charset="2"/>
-              <a:buChar char="Ø"/>
-            </a:pPr>
-            <a:endParaRPr lang="tr-TR" sz="2400" dirty="0">
-              <a:latin typeface="Verdana" panose="020B0604030504040204" pitchFamily="34" charset="0"/>
-              <a:ea typeface="Verdana" panose="020B0604030504040204" pitchFamily="34" charset="0"/>
-              <a:cs typeface="Verdana" panose="020B0604030504040204" pitchFamily="34" charset="0"/>
-            </a:endParaRPr>
-          </a:p>
-        </p:txBody>
-      </p:sp>
-      <p:sp>
-        <p:nvSpPr>
-          <p:cNvPr id="4" name="1 Başlık"/>
-          <p:cNvSpPr txBox="1">
-            <a:spLocks/>
-          </p:cNvSpPr>
-          <p:nvPr/>
-        </p:nvSpPr>
-        <p:spPr>
-          <a:xfrm>
-            <a:off x="0" y="0"/>
-            <a:ext cx="9144000" cy="1143000"/>
-          </a:xfrm>
-          <a:prstGeom prst="rect">
-            <a:avLst/>
-          </a:prstGeom>
-          <a:solidFill>
-            <a:srgbClr val="002060"/>
-          </a:solidFill>
-        </p:spPr>
-        <p:txBody>
-          <a:bodyPr vert="horz" lIns="91440" tIns="45720" rIns="91440" bIns="45720" rtlCol="0" anchor="ctr">
-            <a:normAutofit/>
-          </a:bodyPr>
-          <a:lstStyle>
-            <a:lvl1pPr algn="ctr" defTabSz="914400" rtl="0" eaLnBrk="1" latinLnBrk="0" hangingPunct="1">
-              <a:spcBef>
-                <a:spcPct val="0"/>
-              </a:spcBef>
-              <a:buNone/>
-              <a:defRPr sz="4400" kern="1200">
-                <a:solidFill>
-                  <a:schemeClr val="tx1"/>
-                </a:solidFill>
-                <a:latin typeface="+mj-lt"/>
-                <a:ea typeface="+mj-ea"/>
-                <a:cs typeface="+mj-cs"/>
-              </a:defRPr>
-            </a:lvl1pPr>
-          </a:lstStyle>
-          <a:p>
-            <a:r>
-              <a:rPr lang="tr-TR" sz="3600" dirty="0" err="1">
-                <a:solidFill>
-                  <a:schemeClr val="bg1"/>
-                </a:solidFill>
-                <a:latin typeface="Verdana" panose="020B0604030504040204" pitchFamily="34" charset="0"/>
-                <a:ea typeface="Verdana" panose="020B0604030504040204" pitchFamily="34" charset="0"/>
-                <a:cs typeface="Verdana" panose="020B0604030504040204" pitchFamily="34" charset="0"/>
-              </a:rPr>
-              <a:t>What</a:t>
-            </a:r>
-            <a:r>
-              <a:rPr lang="tr-TR" sz="3600" dirty="0">
-                <a:solidFill>
-                  <a:schemeClr val="bg1"/>
-                </a:solidFill>
-                <a:latin typeface="Verdana" panose="020B0604030504040204" pitchFamily="34" charset="0"/>
-                <a:ea typeface="Verdana" panose="020B0604030504040204" pitchFamily="34" charset="0"/>
-                <a:cs typeface="Verdana" panose="020B0604030504040204" pitchFamily="34" charset="0"/>
-              </a:rPr>
-              <a:t> do </a:t>
-            </a:r>
-            <a:r>
-              <a:rPr lang="tr-TR" sz="3600" dirty="0" err="1">
-                <a:solidFill>
-                  <a:schemeClr val="bg1"/>
-                </a:solidFill>
-                <a:latin typeface="Verdana" panose="020B0604030504040204" pitchFamily="34" charset="0"/>
-                <a:ea typeface="Verdana" panose="020B0604030504040204" pitchFamily="34" charset="0"/>
-                <a:cs typeface="Verdana" panose="020B0604030504040204" pitchFamily="34" charset="0"/>
-              </a:rPr>
-              <a:t>we</a:t>
-            </a:r>
-            <a:r>
-              <a:rPr lang="tr-TR" sz="3600" dirty="0">
-                <a:solidFill>
-                  <a:schemeClr val="bg1"/>
-                </a:solidFill>
-                <a:latin typeface="Verdana" panose="020B0604030504040204" pitchFamily="34" charset="0"/>
-                <a:ea typeface="Verdana" panose="020B0604030504040204" pitchFamily="34" charset="0"/>
-                <a:cs typeface="Verdana" panose="020B0604030504040204" pitchFamily="34" charset="0"/>
-              </a:rPr>
-              <a:t> </a:t>
-            </a:r>
-            <a:r>
-              <a:rPr lang="tr-TR" sz="3600" dirty="0" err="1">
-                <a:solidFill>
-                  <a:schemeClr val="bg1"/>
-                </a:solidFill>
-                <a:latin typeface="Verdana" panose="020B0604030504040204" pitchFamily="34" charset="0"/>
-                <a:ea typeface="Verdana" panose="020B0604030504040204" pitchFamily="34" charset="0"/>
-                <a:cs typeface="Verdana" panose="020B0604030504040204" pitchFamily="34" charset="0"/>
-              </a:rPr>
-              <a:t>know</a:t>
-            </a:r>
-            <a:r>
-              <a:rPr lang="tr-TR" sz="3600" dirty="0">
-                <a:solidFill>
-                  <a:schemeClr val="bg1"/>
-                </a:solidFill>
-                <a:latin typeface="Verdana" panose="020B0604030504040204" pitchFamily="34" charset="0"/>
-                <a:ea typeface="Verdana" panose="020B0604030504040204" pitchFamily="34" charset="0"/>
-                <a:cs typeface="Verdana" panose="020B0604030504040204" pitchFamily="34" charset="0"/>
-              </a:rPr>
-              <a:t> </a:t>
-            </a:r>
-            <a:r>
-              <a:rPr lang="tr-TR" sz="3600" dirty="0" err="1">
-                <a:solidFill>
-                  <a:schemeClr val="bg1"/>
-                </a:solidFill>
-                <a:latin typeface="Verdana" panose="020B0604030504040204" pitchFamily="34" charset="0"/>
-                <a:ea typeface="Verdana" panose="020B0604030504040204" pitchFamily="34" charset="0"/>
-                <a:cs typeface="Verdana" panose="020B0604030504040204" pitchFamily="34" charset="0"/>
-              </a:rPr>
-              <a:t>about</a:t>
-            </a:r>
-            <a:r>
-              <a:rPr lang="tr-TR" sz="3600" dirty="0">
-                <a:solidFill>
-                  <a:schemeClr val="bg1"/>
-                </a:solidFill>
-                <a:latin typeface="Verdana" panose="020B0604030504040204" pitchFamily="34" charset="0"/>
-                <a:ea typeface="Verdana" panose="020B0604030504040204" pitchFamily="34" charset="0"/>
-                <a:cs typeface="Verdana" panose="020B0604030504040204" pitchFamily="34" charset="0"/>
-              </a:rPr>
-              <a:t> 4 </a:t>
-            </a:r>
-            <a:r>
-              <a:rPr lang="tr-TR" sz="3600" dirty="0" err="1">
-                <a:solidFill>
-                  <a:schemeClr val="bg1"/>
-                </a:solidFill>
-                <a:latin typeface="Verdana" panose="020B0604030504040204" pitchFamily="34" charset="0"/>
-                <a:ea typeface="Verdana" panose="020B0604030504040204" pitchFamily="34" charset="0"/>
-                <a:cs typeface="Verdana" panose="020B0604030504040204" pitchFamily="34" charset="0"/>
-              </a:rPr>
-              <a:t>stages</a:t>
-            </a:r>
-            <a:r>
-              <a:rPr lang="tr-TR" sz="3600" dirty="0">
-                <a:solidFill>
-                  <a:schemeClr val="bg1"/>
-                </a:solidFill>
-                <a:latin typeface="Verdana" panose="020B0604030504040204" pitchFamily="34" charset="0"/>
-                <a:ea typeface="Verdana" panose="020B0604030504040204" pitchFamily="34" charset="0"/>
-                <a:cs typeface="Verdana" panose="020B0604030504040204" pitchFamily="34" charset="0"/>
-              </a:rPr>
-              <a:t>?</a:t>
-            </a:r>
-          </a:p>
-        </p:txBody>
-      </p:sp>
-    </p:spTree>
-  </p:cSld>
-  <p:clrMapOvr>
-    <a:masterClrMapping/>
-  </p:clrMapOvr>
-</p:sld>
-</file>
-
-<file path=ppt/slides/slide15.xml><?xml version="1.0" encoding="utf-8"?>
 <p:sld xmlns:a="http://schemas.openxmlformats.org/drawingml/2006/main" xmlns:r="http://schemas.openxmlformats.org/officeDocument/2006/relationships" xmlns:p="http://schemas.openxmlformats.org/presentationml/2006/main">
   <p:cSld>
     <p:spTree>
@@ -6148,7 +5902,7 @@
         </p:spPr>
         <p:txBody>
           <a:bodyPr>
-            <a:normAutofit/>
+            <a:normAutofit fontScale="92500"/>
           </a:bodyPr>
           <a:lstStyle/>
           <a:p>
@@ -6198,7 +5952,7 @@
                 <a:ea typeface="Verdana" panose="020B0604030504040204" pitchFamily="34" charset="0"/>
                 <a:cs typeface="Verdana" panose="020B0604030504040204" pitchFamily="34" charset="0"/>
               </a:rPr>
-              <a:t>Unfunctional</a:t>
+              <a:t>Non-functional</a:t>
             </a:r>
             <a:r>
               <a:rPr lang="tr-TR" sz="2000" dirty="0">
@@ -6242,7 +5996,7 @@
         </p:spPr>
         <p:txBody>
           <a:bodyPr>
-            <a:normAutofit/>
+            <a:normAutofit lnSpcReduction="10000"/>
           </a:bodyPr>
           <a:lstStyle/>
           <a:p>
@@ -6296,7 +6050,7 @@
                 <a:ea typeface="Verdana" panose="020B0604030504040204" pitchFamily="34" charset="0"/>
                 <a:cs typeface="Verdana" panose="020B0604030504040204" pitchFamily="34" charset="0"/>
               </a:rPr>
-              <a:t>login</a:t>
+              <a:t>Authentication</a:t>
             </a:r>
             <a:endParaRPr lang="tr-TR" sz="1800" dirty="0">
               <a:latin typeface="Verdana" panose="020B0604030504040204" pitchFamily="34" charset="0"/>
@@ -6315,7 +6069,7 @@
                 <a:ea typeface="Verdana" panose="020B0604030504040204" pitchFamily="34" charset="0"/>
                 <a:cs typeface="Verdana" panose="020B0604030504040204" pitchFamily="34" charset="0"/>
               </a:rPr>
-              <a:t>Fill</a:t>
+              <a:t>Filling</a:t>
             </a:r>
             <a:r>
               <a:rPr lang="tr-TR" sz="1800" dirty="0">
@@ -6414,7 +6168,7 @@
                 <a:ea typeface="Verdana" panose="020B0604030504040204" pitchFamily="34" charset="0"/>
                 <a:cs typeface="Verdana" panose="020B0604030504040204" pitchFamily="34" charset="0"/>
               </a:rPr>
-              <a:t>Monitor</a:t>
+              <a:t>Monitoring</a:t>
             </a:r>
             <a:r>
               <a:rPr lang="tr-TR" sz="1800" dirty="0">
@@ -6438,7 +6192,23 @@
                 <a:ea typeface="Verdana" panose="020B0604030504040204" pitchFamily="34" charset="0"/>
                 <a:cs typeface="Verdana" panose="020B0604030504040204" pitchFamily="34" charset="0"/>
               </a:rPr>
-              <a:t> organize User Information</a:t>
+              <a:t> </a:t>
+            </a:r>
+            <a:r>
+              <a:rPr lang="tr-TR" sz="1800" dirty="0" err="1">
+                <a:latin typeface="Verdana" panose="020B0604030504040204" pitchFamily="34" charset="0"/>
+                <a:ea typeface="Verdana" panose="020B0604030504040204" pitchFamily="34" charset="0"/>
+                <a:cs typeface="Verdana" panose="020B0604030504040204" pitchFamily="34" charset="0"/>
+              </a:rPr>
+              <a:t>organizing</a:t>
+            </a:r>
+            <a:r>
+              <a:rPr lang="tr-TR" sz="1800" dirty="0">
+                <a:latin typeface="Verdana" panose="020B0604030504040204" pitchFamily="34" charset="0"/>
+                <a:ea typeface="Verdana" panose="020B0604030504040204" pitchFamily="34" charset="0"/>
+                <a:cs typeface="Verdana" panose="020B0604030504040204" pitchFamily="34" charset="0"/>
+              </a:rPr>
+              <a:t> User Information</a:t>
             </a:r>
           </a:p>
           <a:p>
@@ -6447,20 +6217,12 @@
               <a:buChar char="Ø"/>
             </a:pPr>
             <a:r>
-              <a:rPr lang="tr-TR" sz="1800" dirty="0" err="1">
-                <a:latin typeface="Verdana" panose="020B0604030504040204" pitchFamily="34" charset="0"/>
-                <a:ea typeface="Verdana" panose="020B0604030504040204" pitchFamily="34" charset="0"/>
-                <a:cs typeface="Verdana" panose="020B0604030504040204" pitchFamily="34" charset="0"/>
-              </a:rPr>
-              <a:t>Use</a:t>
-            </a:r>
-            <a:r>
               <a:rPr lang="tr-TR" sz="1800" dirty="0">
                 <a:latin typeface="Verdana" panose="020B0604030504040204" pitchFamily="34" charset="0"/>
                 <a:ea typeface="Verdana" panose="020B0604030504040204" pitchFamily="34" charset="0"/>
                 <a:cs typeface="Verdana" panose="020B0604030504040204" pitchFamily="34" charset="0"/>
               </a:rPr>
-              <a:t> Chrome </a:t>
+              <a:t>Using Chrome </a:t>
             </a:r>
             <a:r>
               <a:rPr lang="tr-TR" sz="1800" dirty="0" err="1">
@@ -6553,14 +6315,11 @@
               </a:rPr>
               <a:t>website</a:t>
             </a:r>
-            <a:r>
-              <a:rPr lang="tr-TR" sz="1800" dirty="0">
-                <a:latin typeface="Verdana" panose="020B0604030504040204" pitchFamily="34" charset="0"/>
-                <a:ea typeface="Verdana" panose="020B0604030504040204" pitchFamily="34" charset="0"/>
-                <a:cs typeface="Verdana" panose="020B0604030504040204" pitchFamily="34" charset="0"/>
-              </a:rPr>
-              <a:t>.</a:t>
-            </a:r>
+            <a:endParaRPr lang="tr-TR" sz="1800" dirty="0">
+              <a:latin typeface="Verdana" panose="020B0604030504040204" pitchFamily="34" charset="0"/>
+              <a:ea typeface="Verdana" panose="020B0604030504040204" pitchFamily="34" charset="0"/>
+              <a:cs typeface="Verdana" panose="020B0604030504040204" pitchFamily="34" charset="0"/>
+            </a:endParaRPr>
           </a:p>
           <a:p>
             <a:pPr>
@@ -6568,13 +6327,66 @@
               <a:buChar char="Ø"/>
             </a:pPr>
             <a:r>
+              <a:rPr lang="tr-TR" sz="1800" dirty="0" err="1">
+                <a:latin typeface="Verdana" panose="020B0604030504040204" pitchFamily="34" charset="0"/>
+                <a:ea typeface="Verdana" panose="020B0604030504040204" pitchFamily="34" charset="0"/>
+                <a:cs typeface="Verdana" panose="020B0604030504040204" pitchFamily="34" charset="0"/>
+              </a:rPr>
+              <a:t>Testing</a:t>
+            </a:r>
+            <a:r>
               <a:rPr lang="tr-TR" sz="1800" dirty="0">
                 <a:latin typeface="Verdana" panose="020B0604030504040204" pitchFamily="34" charset="0"/>
                 <a:ea typeface="Verdana" panose="020B0604030504040204" pitchFamily="34" charset="0"/>
                 <a:cs typeface="Verdana" panose="020B0604030504040204" pitchFamily="34" charset="0"/>
               </a:rPr>
-              <a:t>Test</a:t>
-            </a:r>
+              <a:t> </a:t>
+            </a:r>
+            <a:r>
+              <a:rPr lang="tr-TR" sz="1800" dirty="0" err="1">
+                <a:latin typeface="Verdana" panose="020B0604030504040204" pitchFamily="34" charset="0"/>
+                <a:ea typeface="Verdana" panose="020B0604030504040204" pitchFamily="34" charset="0"/>
+                <a:cs typeface="Verdana" panose="020B0604030504040204" pitchFamily="34" charset="0"/>
+              </a:rPr>
+              <a:t>users</a:t>
+            </a:r>
+            <a:r>
+              <a:rPr lang="tr-TR" sz="1800" dirty="0">
+                <a:latin typeface="Verdana" panose="020B0604030504040204" pitchFamily="34" charset="0"/>
+                <a:ea typeface="Verdana" panose="020B0604030504040204" pitchFamily="34" charset="0"/>
+                <a:cs typeface="Verdana" panose="020B0604030504040204" pitchFamily="34" charset="0"/>
+              </a:rPr>
+              <a:t> </a:t>
+            </a:r>
+            <a:r>
+              <a:rPr lang="tr-TR" sz="1800" dirty="0" err="1">
+                <a:latin typeface="Verdana" panose="020B0604030504040204" pitchFamily="34" charset="0"/>
+                <a:ea typeface="Verdana" panose="020B0604030504040204" pitchFamily="34" charset="0"/>
+                <a:cs typeface="Verdana" panose="020B0604030504040204" pitchFamily="34" charset="0"/>
+              </a:rPr>
+              <a:t>shopping</a:t>
+            </a:r>
+            <a:r>
+              <a:rPr lang="tr-TR" sz="1800" dirty="0">
+                <a:latin typeface="Verdana" panose="020B0604030504040204" pitchFamily="34" charset="0"/>
+                <a:ea typeface="Verdana" panose="020B0604030504040204" pitchFamily="34" charset="0"/>
+                <a:cs typeface="Verdana" panose="020B0604030504040204" pitchFamily="34" charset="0"/>
+              </a:rPr>
+              <a:t> </a:t>
+            </a:r>
+            <a:r>
+              <a:rPr lang="tr-TR" sz="1800" dirty="0" err="1">
+                <a:latin typeface="Verdana" panose="020B0604030504040204" pitchFamily="34" charset="0"/>
+                <a:ea typeface="Verdana" panose="020B0604030504040204" pitchFamily="34" charset="0"/>
+                <a:cs typeface="Verdana" panose="020B0604030504040204" pitchFamily="34" charset="0"/>
+              </a:rPr>
+              <a:t>behaviors</a:t>
+            </a:r>
+            <a:endParaRPr lang="tr-TR" sz="1800" dirty="0">
+              <a:latin typeface="Verdana" panose="020B0604030504040204" pitchFamily="34" charset="0"/>
+              <a:ea typeface="Verdana" panose="020B0604030504040204" pitchFamily="34" charset="0"/>
+              <a:cs typeface="Verdana" panose="020B0604030504040204" pitchFamily="34" charset="0"/>
+            </a:endParaRPr>
           </a:p>
           <a:p>
             <a:pPr>
@@ -6587,7 +6399,7 @@
                 <a:ea typeface="Verdana" panose="020B0604030504040204" pitchFamily="34" charset="0"/>
                 <a:cs typeface="Verdana" panose="020B0604030504040204" pitchFamily="34" charset="0"/>
               </a:rPr>
-              <a:t>Give</a:t>
+              <a:t>Giving</a:t>
             </a:r>
             <a:r>
               <a:rPr lang="tr-TR" sz="1800" dirty="0">
@@ -6605,11 +6417,14 @@
               </a:rPr>
               <a:t>advice</a:t>
             </a:r>
-            <a:endParaRPr lang="tr-TR" sz="1800" dirty="0">
-              <a:latin typeface="Verdana" panose="020B0604030504040204" pitchFamily="34" charset="0"/>
-              <a:ea typeface="Verdana" panose="020B0604030504040204" pitchFamily="34" charset="0"/>
-              <a:cs typeface="Verdana" panose="020B0604030504040204" pitchFamily="34" charset="0"/>
-            </a:endParaRPr>
+            <a:r>
+              <a:rPr lang="tr-TR" sz="1800" dirty="0">
+                <a:latin typeface="Verdana" panose="020B0604030504040204" pitchFamily="34" charset="0"/>
+                <a:ea typeface="Verdana" panose="020B0604030504040204" pitchFamily="34" charset="0"/>
+                <a:cs typeface="Verdana" panose="020B0604030504040204" pitchFamily="34" charset="0"/>
+              </a:rPr>
+              <a:t> </a:t>
+            </a:r>
           </a:p>
           <a:p>
             <a:pPr>
@@ -6862,10 +6677,13 @@
   <p:clrMapOvr>
     <a:masterClrMapping/>
   </p:clrMapOvr>
+  <p:transition spd="med">
+    <p:pull/>
+  </p:transition>
 </p:sld>
 </file>
 
-<file path=ppt/slides/slide16.xml><?xml version="1.0" encoding="utf-8"?>
+<file path=ppt/slides/slide15.xml><?xml version="1.0" encoding="utf-8"?>
 <p:sld xmlns:a="http://schemas.openxmlformats.org/drawingml/2006/main" xmlns:r="http://schemas.openxmlformats.org/officeDocument/2006/relationships" xmlns:p="http://schemas.openxmlformats.org/presentationml/2006/main">
   <p:cSld>
     <p:spTree>
@@ -7021,7 +6839,7 @@
                 <a:ea typeface="Verdana" panose="020B0604030504040204" pitchFamily="34" charset="0"/>
                 <a:cs typeface="Verdana" panose="020B0604030504040204" pitchFamily="34" charset="0"/>
               </a:rPr>
-              <a:t>Creating a Web Service </a:t>
+              <a:t>Creating Chrome Extension</a:t>
             </a:r>
           </a:p>
           <a:p>
@@ -7035,8 +6853,18 @@
                 <a:ea typeface="Verdana" panose="020B0604030504040204" pitchFamily="34" charset="0"/>
                 <a:cs typeface="Verdana" panose="020B0604030504040204" pitchFamily="34" charset="0"/>
               </a:rPr>
-              <a:t>Creating Chrome Extension</a:t>
-            </a:r>
+              <a:t>Creating a Web Service </a:t>
+            </a:r>
+          </a:p>
+          <a:p>
+            <a:pPr marL="0" indent="0">
+              <a:buNone/>
+            </a:pPr>
+            <a:endParaRPr lang="tr-TR" sz="2400" dirty="0">
+              <a:latin typeface="Verdana" panose="020B0604030504040204" pitchFamily="34" charset="0"/>
+              <a:ea typeface="Verdana" panose="020B0604030504040204" pitchFamily="34" charset="0"/>
+              <a:cs typeface="Verdana" panose="020B0604030504040204" pitchFamily="34" charset="0"/>
+            </a:endParaRPr>
           </a:p>
           <a:p>
             <a:pPr marL="0" indent="0">
@@ -7069,7 +6897,51 @@
                 <a:ea typeface="Verdana" panose="020B0604030504040204" pitchFamily="34" charset="0"/>
                 <a:cs typeface="Verdana" panose="020B0604030504040204" pitchFamily="34" charset="0"/>
               </a:rPr>
-              <a:t>Which development tools do </a:t>
+              <a:t>Which </a:t>
+            </a:r>
+            <a:r>
+              <a:rPr lang="tr-TR" sz="2400" dirty="0" err="1">
+                <a:solidFill>
+                  <a:srgbClr val="FF0000"/>
+                </a:solidFill>
+                <a:latin typeface="Verdana" panose="020B0604030504040204" pitchFamily="34" charset="0"/>
+                <a:ea typeface="Verdana" panose="020B0604030504040204" pitchFamily="34" charset="0"/>
+                <a:cs typeface="Verdana" panose="020B0604030504040204" pitchFamily="34" charset="0"/>
+              </a:rPr>
+              <a:t>development</a:t>
+            </a:r>
+            <a:r>
+              <a:rPr lang="tr-TR" sz="2400" dirty="0">
+                <a:solidFill>
+                  <a:srgbClr val="FF0000"/>
+                </a:solidFill>
+                <a:latin typeface="Verdana" panose="020B0604030504040204" pitchFamily="34" charset="0"/>
+                <a:ea typeface="Verdana" panose="020B0604030504040204" pitchFamily="34" charset="0"/>
+                <a:cs typeface="Verdana" panose="020B0604030504040204" pitchFamily="34" charset="0"/>
+              </a:rPr>
+              <a:t> </a:t>
+            </a:r>
+            <a:r>
+              <a:rPr lang="tr-TR" sz="2400" dirty="0" err="1">
+                <a:solidFill>
+                  <a:srgbClr val="FF0000"/>
+                </a:solidFill>
+                <a:latin typeface="Verdana" panose="020B0604030504040204" pitchFamily="34" charset="0"/>
+                <a:ea typeface="Verdana" panose="020B0604030504040204" pitchFamily="34" charset="0"/>
+                <a:cs typeface="Verdana" panose="020B0604030504040204" pitchFamily="34" charset="0"/>
+              </a:rPr>
+              <a:t>tools</a:t>
+            </a:r>
+            <a:r>
+              <a:rPr lang="tr-TR" sz="2400" dirty="0">
+                <a:solidFill>
+                  <a:srgbClr val="FF0000"/>
+                </a:solidFill>
+                <a:latin typeface="Verdana" panose="020B0604030504040204" pitchFamily="34" charset="0"/>
+                <a:ea typeface="Verdana" panose="020B0604030504040204" pitchFamily="34" charset="0"/>
+                <a:cs typeface="Verdana" panose="020B0604030504040204" pitchFamily="34" charset="0"/>
+              </a:rPr>
+              <a:t> </a:t>
             </a:r>
             <a:r>
               <a:rPr lang="tr-TR" sz="2400" dirty="0" err="1">
@@ -7204,10 +7076,13 @@
   <p:clrMapOvr>
     <a:masterClrMapping/>
   </p:clrMapOvr>
+  <p:transition spd="med">
+    <p:pull/>
+  </p:transition>
 </p:sld>
 </file>
 
-<file path=ppt/slides/slide17.xml><?xml version="1.0" encoding="utf-8"?>
+<file path=ppt/slides/slide16.xml><?xml version="1.0" encoding="utf-8"?>
 <p:sld xmlns:a="http://schemas.openxmlformats.org/drawingml/2006/main" xmlns:r="http://schemas.openxmlformats.org/officeDocument/2006/relationships" xmlns:p="http://schemas.openxmlformats.org/presentationml/2006/main">
   <p:cSld>
     <p:spTree>
@@ -7427,10 +7302,13 @@
   <p:clrMapOvr>
     <a:masterClrMapping/>
   </p:clrMapOvr>
+  <p:transition spd="med">
+    <p:pull/>
+  </p:transition>
 </p:sld>
 </file>
 
-<file path=ppt/slides/slide18.xml><?xml version="1.0" encoding="utf-8"?>
+<file path=ppt/slides/slide17.xml><?xml version="1.0" encoding="utf-8"?>
 <p:sld xmlns:a="http://schemas.openxmlformats.org/drawingml/2006/main" xmlns:r="http://schemas.openxmlformats.org/officeDocument/2006/relationships" xmlns:p="http://schemas.openxmlformats.org/presentationml/2006/main">
   <p:cSld>
     <p:spTree>
@@ -7575,10 +7453,13 @@
   <p:clrMapOvr>
     <a:masterClrMapping/>
   </p:clrMapOvr>
+  <p:transition spd="med">
+    <p:pull/>
+  </p:transition>
 </p:sld>
 </file>
 
-<file path=ppt/slides/slide19.xml><?xml version="1.0" encoding="utf-8"?>
+<file path=ppt/slides/slide18.xml><?xml version="1.0" encoding="utf-8"?>
 <p:sld xmlns:a="http://schemas.openxmlformats.org/drawingml/2006/main" xmlns:r="http://schemas.openxmlformats.org/officeDocument/2006/relationships" xmlns:p="http://schemas.openxmlformats.org/presentationml/2006/main">
   <p:cSld>
     <p:spTree>
@@ -7740,120 +7621,13 @@
   <p:clrMapOvr>
     <a:masterClrMapping/>
   </p:clrMapOvr>
+  <p:transition spd="med">
+    <p:pull/>
+  </p:transition>
 </p:sld>
 </file>
 
-<file path=ppt/slides/slide2.xml><?xml version="1.0" encoding="utf-8"?>
-<p:sld xmlns:a="http://schemas.openxmlformats.org/drawingml/2006/main" xmlns:r="http://schemas.openxmlformats.org/officeDocument/2006/relationships" xmlns:p="http://schemas.openxmlformats.org/presentationml/2006/main">
-  <p:cSld>
-    <p:spTree>
-      <p:nvGrpSpPr>
-        <p:cNvPr id="1" name=""/>
-        <p:cNvGrpSpPr/>
-        <p:nvPr/>
-      </p:nvGrpSpPr>
-      <p:grpSpPr>
-        <a:xfrm>
-          <a:off x="0" y="0"/>
-          <a:ext cx="0" cy="0"/>
-          <a:chOff x="0" y="0"/>
-          <a:chExt cx="0" cy="0"/>
-        </a:xfrm>
-      </p:grpSpPr>
-      <p:sp>
-        <p:nvSpPr>
-          <p:cNvPr id="2" name="1 Başlık"/>
-          <p:cNvSpPr>
-            <a:spLocks noGrp="1"/>
-          </p:cNvSpPr>
-          <p:nvPr>
-            <p:ph type="title"/>
-          </p:nvPr>
-        </p:nvSpPr>
-        <p:spPr>
-          <a:xfrm>
-            <a:off x="0" y="0"/>
-            <a:ext cx="9144000" cy="1143000"/>
-          </a:xfrm>
-          <a:solidFill>
-            <a:srgbClr val="002060"/>
-          </a:solidFill>
-        </p:spPr>
-        <p:txBody>
-          <a:bodyPr>
-            <a:normAutofit/>
-          </a:bodyPr>
-          <a:lstStyle/>
-          <a:p>
-            <a:r>
-              <a:rPr lang="tr-TR" sz="4000" dirty="0">
-                <a:solidFill>
-                  <a:schemeClr val="bg1"/>
-                </a:solidFill>
-                <a:latin typeface="Verdana" panose="020B0604030504040204" pitchFamily="34" charset="0"/>
-                <a:ea typeface="Verdana" panose="020B0604030504040204" pitchFamily="34" charset="0"/>
-                <a:cs typeface="Verdana" panose="020B0604030504040204" pitchFamily="34" charset="0"/>
-              </a:rPr>
-              <a:t>What is the economic crisis?</a:t>
-            </a:r>
-          </a:p>
-        </p:txBody>
-      </p:sp>
-      <p:sp>
-        <p:nvSpPr>
-          <p:cNvPr id="3" name="2 İçerik Yer Tutucusu"/>
-          <p:cNvSpPr>
-            <a:spLocks noGrp="1"/>
-          </p:cNvSpPr>
-          <p:nvPr>
-            <p:ph idx="1"/>
-          </p:nvPr>
-        </p:nvSpPr>
-        <p:spPr>
-          <a:xfrm>
-            <a:off x="0" y="2852936"/>
-            <a:ext cx="9144000" cy="1714512"/>
-          </a:xfrm>
-        </p:spPr>
-        <p:txBody>
-          <a:bodyPr>
-            <a:normAutofit/>
-          </a:bodyPr>
-          <a:lstStyle/>
-          <a:p>
-            <a:pPr marL="0" indent="0" algn="ctr">
-              <a:buNone/>
-            </a:pPr>
-            <a:r>
-              <a:rPr lang="tr-TR" dirty="0">
-                <a:latin typeface="Verdana" panose="020B0604030504040204" pitchFamily="34" charset="0"/>
-                <a:ea typeface="Verdana" panose="020B0604030504040204" pitchFamily="34" charset="0"/>
-                <a:cs typeface="Verdana" panose="020B0604030504040204" pitchFamily="34" charset="0"/>
-              </a:rPr>
-              <a:t>A situation in which the economy of country experiences a sudden downturn brought on by a financial crisis</a:t>
-            </a:r>
-          </a:p>
-          <a:p>
-            <a:pPr>
-              <a:buNone/>
-            </a:pPr>
-            <a:endParaRPr lang="tr-TR" dirty="0">
-              <a:latin typeface="Verdana" panose="020B0604030504040204" pitchFamily="34" charset="0"/>
-              <a:ea typeface="Verdana" panose="020B0604030504040204" pitchFamily="34" charset="0"/>
-              <a:cs typeface="Verdana" panose="020B0604030504040204" pitchFamily="34" charset="0"/>
-            </a:endParaRPr>
-          </a:p>
-        </p:txBody>
-      </p:sp>
-    </p:spTree>
-  </p:cSld>
-  <p:clrMapOvr>
-    <a:masterClrMapping/>
-  </p:clrMapOvr>
-</p:sld>
-</file>
-
-<file path=ppt/slides/slide20.xml><?xml version="1.0" encoding="utf-8"?>
+<file path=ppt/slides/slide19.xml><?xml version="1.0" encoding="utf-8"?>
 <p:sld xmlns:a="http://schemas.openxmlformats.org/drawingml/2006/main" xmlns:r="http://schemas.openxmlformats.org/officeDocument/2006/relationships" xmlns:p="http://schemas.openxmlformats.org/presentationml/2006/main">
   <p:cSld>
     <p:spTree>
@@ -7920,7 +7694,7 @@
                 <a:ea typeface="Verdana" panose="020B0604030504040204" pitchFamily="34" charset="0"/>
                 <a:cs typeface="Verdana" panose="020B0604030504040204" pitchFamily="34" charset="0"/>
               </a:rPr>
-              <a:t>THANK YOU FOR LISTENING</a:t>
+              <a:t>THANKS FOR LISTENING</a:t>
             </a:r>
           </a:p>
           <a:p>
@@ -7978,7 +7752,7 @@
                 <a:ea typeface="Verdana" panose="020B0604030504040204" pitchFamily="34" charset="0"/>
                 <a:cs typeface="Verdana" panose="020B0604030504040204" pitchFamily="34" charset="0"/>
               </a:rPr>
-              <a:t>Hakan YILDIZ – Okan OZTABAN</a:t>
+              <a:t>Hakan YILDIZ – Okan ÖZTABAN</a:t>
             </a:r>
           </a:p>
         </p:txBody>
@@ -7988,6 +7762,122 @@
   <p:clrMapOvr>
     <a:masterClrMapping/>
   </p:clrMapOvr>
+  <p:transition spd="med">
+    <p:pull/>
+  </p:transition>
+</p:sld>
+</file>
+
+<file path=ppt/slides/slide2.xml><?xml version="1.0" encoding="utf-8"?>
+<p:sld xmlns:a="http://schemas.openxmlformats.org/drawingml/2006/main" xmlns:r="http://schemas.openxmlformats.org/officeDocument/2006/relationships" xmlns:p="http://schemas.openxmlformats.org/presentationml/2006/main">
+  <p:cSld>
+    <p:spTree>
+      <p:nvGrpSpPr>
+        <p:cNvPr id="1" name=""/>
+        <p:cNvGrpSpPr/>
+        <p:nvPr/>
+      </p:nvGrpSpPr>
+      <p:grpSpPr>
+        <a:xfrm>
+          <a:off x="0" y="0"/>
+          <a:ext cx="0" cy="0"/>
+          <a:chOff x="0" y="0"/>
+          <a:chExt cx="0" cy="0"/>
+        </a:xfrm>
+      </p:grpSpPr>
+      <p:sp>
+        <p:nvSpPr>
+          <p:cNvPr id="2" name="1 Başlık"/>
+          <p:cNvSpPr>
+            <a:spLocks noGrp="1"/>
+          </p:cNvSpPr>
+          <p:nvPr>
+            <p:ph type="title"/>
+          </p:nvPr>
+        </p:nvSpPr>
+        <p:spPr>
+          <a:xfrm>
+            <a:off x="0" y="0"/>
+            <a:ext cx="9144000" cy="1143000"/>
+          </a:xfrm>
+          <a:solidFill>
+            <a:srgbClr val="002060"/>
+          </a:solidFill>
+        </p:spPr>
+        <p:txBody>
+          <a:bodyPr>
+            <a:normAutofit/>
+          </a:bodyPr>
+          <a:lstStyle/>
+          <a:p>
+            <a:r>
+              <a:rPr lang="tr-TR" sz="4000" dirty="0">
+                <a:solidFill>
+                  <a:schemeClr val="bg1"/>
+                </a:solidFill>
+                <a:latin typeface="Verdana" panose="020B0604030504040204" pitchFamily="34" charset="0"/>
+                <a:ea typeface="Verdana" panose="020B0604030504040204" pitchFamily="34" charset="0"/>
+                <a:cs typeface="Verdana" panose="020B0604030504040204" pitchFamily="34" charset="0"/>
+              </a:rPr>
+              <a:t>What is the economic crisis?</a:t>
+            </a:r>
+          </a:p>
+        </p:txBody>
+      </p:sp>
+      <p:sp>
+        <p:nvSpPr>
+          <p:cNvPr id="3" name="2 İçerik Yer Tutucusu"/>
+          <p:cNvSpPr>
+            <a:spLocks noGrp="1"/>
+          </p:cNvSpPr>
+          <p:nvPr>
+            <p:ph idx="1"/>
+          </p:nvPr>
+        </p:nvSpPr>
+        <p:spPr>
+          <a:xfrm>
+            <a:off x="0" y="2852936"/>
+            <a:ext cx="9144000" cy="1714512"/>
+          </a:xfrm>
+        </p:spPr>
+        <p:txBody>
+          <a:bodyPr>
+            <a:normAutofit/>
+          </a:bodyPr>
+          <a:lstStyle/>
+          <a:p>
+            <a:pPr marL="0" indent="0" algn="ctr">
+              <a:buNone/>
+            </a:pPr>
+            <a:r>
+              <a:rPr lang="tr-TR" dirty="0">
+                <a:latin typeface="Verdana" panose="020B0604030504040204" pitchFamily="34" charset="0"/>
+                <a:ea typeface="Verdana" panose="020B0604030504040204" pitchFamily="34" charset="0"/>
+                <a:cs typeface="Verdana" panose="020B0604030504040204" pitchFamily="34" charset="0"/>
+              </a:rPr>
+              <a:t>A situation in which the economy of country experiences a sudden downturn brought on by a financial crisis</a:t>
+            </a:r>
+          </a:p>
+          <a:p>
+            <a:pPr>
+              <a:buNone/>
+            </a:pPr>
+            <a:endParaRPr lang="tr-TR" dirty="0">
+              <a:latin typeface="Verdana" panose="020B0604030504040204" pitchFamily="34" charset="0"/>
+              <a:ea typeface="Verdana" panose="020B0604030504040204" pitchFamily="34" charset="0"/>
+              <a:cs typeface="Verdana" panose="020B0604030504040204" pitchFamily="34" charset="0"/>
+            </a:endParaRPr>
+          </a:p>
+        </p:txBody>
+      </p:sp>
+    </p:spTree>
+  </p:cSld>
+  <p:clrMapOvr>
+    <a:masterClrMapping/>
+  </p:clrMapOvr>
+  <p:transition spd="med">
+    <p:pull/>
+  </p:transition>
 </p:sld>
 </file>
 
@@ -8339,6 +8229,9 @@
   <p:clrMapOvr>
     <a:masterClrMapping/>
   </p:clrMapOvr>
+  <p:transition spd="med">
+    <p:pull/>
+  </p:transition>
 </p:sld>
 </file>
 
@@ -8815,6 +8708,9 @@
   <p:clrMapOvr>
     <a:masterClrMapping/>
   </p:clrMapOvr>
+  <p:transition spd="med">
+    <p:pull/>
+  </p:transition>
 </p:sld>
 </file>
 
@@ -10009,6 +9905,9 @@
   <p:clrMapOvr>
     <a:masterClrMapping/>
   </p:clrMapOvr>
+  <p:transition spd="med">
+    <p:pull/>
+  </p:transition>
 </p:sld>
 </file>
 
@@ -10320,23 +10219,7 @@
                 <a:ea typeface="Verdana" panose="020B0604030504040204" pitchFamily="34" charset="0"/>
                 <a:cs typeface="Verdana" panose="020B0604030504040204" pitchFamily="34" charset="0"/>
               </a:rPr>
-              <a:t> </a:t>
-            </a:r>
-            <a:r>
-              <a:rPr lang="tr-TR" sz="2400" dirty="0" err="1">
-                <a:latin typeface="Verdana" panose="020B0604030504040204" pitchFamily="34" charset="0"/>
-                <a:ea typeface="Verdana" panose="020B0604030504040204" pitchFamily="34" charset="0"/>
-                <a:cs typeface="Verdana" panose="020B0604030504040204" pitchFamily="34" charset="0"/>
-              </a:rPr>
-              <a:t>for</a:t>
-            </a:r>
-            <a:r>
-              <a:rPr lang="tr-TR" sz="2400" dirty="0">
-                <a:latin typeface="Verdana" panose="020B0604030504040204" pitchFamily="34" charset="0"/>
-                <a:ea typeface="Verdana" panose="020B0604030504040204" pitchFamily="34" charset="0"/>
-                <a:cs typeface="Verdana" panose="020B0604030504040204" pitchFamily="34" charset="0"/>
-              </a:rPr>
-              <a:t> Economic Crisis?</a:t>
+              <a:t> of Economic Crisis?</a:t>
             </a:r>
           </a:p>
           <a:p>
@@ -10562,6 +10445,9 @@
   <p:clrMapOvr>
     <a:masterClrMapping/>
   </p:clrMapOvr>
+  <p:transition spd="med">
+    <p:pull/>
+  </p:transition>
 </p:sld>
 </file>
 
@@ -10622,7 +10508,7 @@
         </p:spPr>
         <p:txBody>
           <a:bodyPr>
-            <a:normAutofit lnSpcReduction="10000"/>
+            <a:normAutofit fontScale="92500" lnSpcReduction="10000"/>
           </a:bodyPr>
           <a:lstStyle/>
           <a:p>
@@ -10740,7 +10626,39 @@
                 <a:ea typeface="Verdana" panose="020B0604030504040204" pitchFamily="34" charset="0"/>
                 <a:cs typeface="Verdana" panose="020B0604030504040204" pitchFamily="34" charset="0"/>
               </a:rPr>
-              <a:t> is a financial crisis in which individuals who is living in that country, are unbalanced spending and overtaking extremly borrowing </a:t>
+              <a:t> is a financial crisis in which individuals who is living in that country, are unbalanced spending and </a:t>
+            </a:r>
+            <a:r>
+              <a:rPr lang="tr-TR" sz="2800" dirty="0" err="1">
+                <a:latin typeface="Verdana" panose="020B0604030504040204" pitchFamily="34" charset="0"/>
+                <a:ea typeface="Verdana" panose="020B0604030504040204" pitchFamily="34" charset="0"/>
+                <a:cs typeface="Verdana" panose="020B0604030504040204" pitchFamily="34" charset="0"/>
+              </a:rPr>
+              <a:t>overtaking</a:t>
+            </a:r>
+            <a:r>
+              <a:rPr lang="tr-TR" sz="2800" dirty="0">
+                <a:latin typeface="Verdana" panose="020B0604030504040204" pitchFamily="34" charset="0"/>
+                <a:ea typeface="Verdana" panose="020B0604030504040204" pitchFamily="34" charset="0"/>
+                <a:cs typeface="Verdana" panose="020B0604030504040204" pitchFamily="34" charset="0"/>
+              </a:rPr>
+              <a:t> </a:t>
+            </a:r>
+            <a:r>
+              <a:rPr lang="tr-TR" sz="2800" dirty="0" err="1">
+                <a:latin typeface="Verdana" panose="020B0604030504040204" pitchFamily="34" charset="0"/>
+                <a:ea typeface="Verdana" panose="020B0604030504040204" pitchFamily="34" charset="0"/>
+                <a:cs typeface="Verdana" panose="020B0604030504040204" pitchFamily="34" charset="0"/>
+              </a:rPr>
+              <a:t>extremely</a:t>
+            </a:r>
+            <a:r>
+              <a:rPr lang="tr-TR" sz="2800" dirty="0">
+                <a:latin typeface="Verdana" panose="020B0604030504040204" pitchFamily="34" charset="0"/>
+                <a:ea typeface="Verdana" panose="020B0604030504040204" pitchFamily="34" charset="0"/>
+                <a:cs typeface="Verdana" panose="020B0604030504040204" pitchFamily="34" charset="0"/>
+              </a:rPr>
+              <a:t> borrowing </a:t>
             </a:r>
           </a:p>
           <a:p>
@@ -10876,6 +10794,9 @@
   <p:clrMapOvr>
     <a:masterClrMapping/>
   </p:clrMapOvr>
+  <p:transition spd="med">
+    <p:pull/>
+  </p:transition>
 </p:sld>
 </file>
 
@@ -11694,7 +11615,7 @@
       </p:graphicFrame>
       <p:pic>
         <p:nvPicPr>
-          <p:cNvPr id="13" name="Resim 12"/>
+          <p:cNvPr id="2" name="Resim 1"/>
           <p:cNvPicPr>
             <a:picLocks noChangeAspect="1"/>
           </p:cNvPicPr>
@@ -11714,8 +11635,8 @@
         </p:blipFill>
         <p:spPr>
           <a:xfrm>
-            <a:off x="3846089" y="1844824"/>
-            <a:ext cx="5298904" cy="3235864"/>
+            <a:off x="3707905" y="1544230"/>
+            <a:ext cx="5400600" cy="3612962"/>
           </a:xfrm>
           <a:prstGeom prst="rect">
             <a:avLst/>
@@ -11727,6 +11648,9 @@
   <p:clrMapOvr>
     <a:masterClrMapping/>
   </p:clrMapOvr>
+  <p:transition spd="med">
+    <p:pull/>
+  </p:transition>
 </p:sld>
 </file>
 
@@ -26909,6 +26833,9 @@
   <p:clrMapOvr>
     <a:masterClrMapping/>
   </p:clrMapOvr>
+  <p:transition spd="med">
+    <p:pull/>
+  </p:transition>
 </p:sld>
 </file>
 

</xml_diff>